<commit_message>
almost there, final report remains
</commit_message>
<xml_diff>
--- a/Projects/4UppsalaMMS/3_StatsScouting/assignment_2_evaluating_players.pptx
+++ b/Projects/4UppsalaMMS/3_StatsScouting/assignment_2_evaluating_players.pptx
@@ -8,6 +8,8 @@
     <p:sldId id="256" r:id="rId2"/>
     <p:sldId id="257" r:id="rId3"/>
     <p:sldId id="258" r:id="rId4"/>
+    <p:sldId id="260" r:id="rId5"/>
+    <p:sldId id="259" r:id="rId6"/>
   </p:sldIdLst>
   <p:sldSz cx="12192000" cy="6858000"/>
   <p:notesSz cx="6858000" cy="9144000"/>
@@ -114,6 +116,8 @@
             <p14:sldId id="256"/>
             <p14:sldId id="257"/>
             <p14:sldId id="258"/>
+            <p14:sldId id="260"/>
+            <p14:sldId id="259"/>
           </p14:sldIdLst>
         </p14:section>
       </p14:sectionLst>
@@ -3431,16 +3435,109 @@
           <a:chExt cx="0" cy="0"/>
         </a:xfrm>
       </p:grpSpPr>
+      <p:sp>
+        <p:nvSpPr>
+          <p:cNvPr id="2" name="Title 1">
+            <a:extLst>
+              <a:ext uri="{FF2B5EF4-FFF2-40B4-BE49-F238E27FC236}">
+                <a16:creationId xmlns:a16="http://schemas.microsoft.com/office/drawing/2014/main" id="{1EA14AED-E892-0E44-8DB1-27409BE942B4}"/>
+              </a:ext>
+            </a:extLst>
+          </p:cNvPr>
+          <p:cNvSpPr>
+            <a:spLocks noGrp="1"/>
+          </p:cNvSpPr>
+          <p:nvPr>
+            <p:ph type="title"/>
+          </p:nvPr>
+        </p:nvSpPr>
+        <p:spPr/>
+        <p:txBody>
+          <a:bodyPr/>
+          <a:lstStyle/>
+          <a:p>
+            <a:r>
+              <a:rPr lang="en-US" b="1" dirty="0"/>
+              <a:t>Metric</a:t>
+            </a:r>
+          </a:p>
+        </p:txBody>
+      </p:sp>
+      <p:sp>
+        <p:nvSpPr>
+          <p:cNvPr id="3" name="Content Placeholder 2">
+            <a:extLst>
+              <a:ext uri="{FF2B5EF4-FFF2-40B4-BE49-F238E27FC236}">
+                <a16:creationId xmlns:a16="http://schemas.microsoft.com/office/drawing/2014/main" id="{C2F341F4-6ADF-D24F-86D9-55634BE3C1C0}"/>
+              </a:ext>
+            </a:extLst>
+          </p:cNvPr>
+          <p:cNvSpPr>
+            <a:spLocks noGrp="1"/>
+          </p:cNvSpPr>
+          <p:nvPr>
+            <p:ph idx="1"/>
+          </p:nvPr>
+        </p:nvSpPr>
+        <p:spPr>
+          <a:xfrm>
+            <a:off x="988102" y="3796832"/>
+            <a:ext cx="10515600" cy="4351338"/>
+          </a:xfrm>
+        </p:spPr>
+        <p:txBody>
+          <a:bodyPr>
+            <a:normAutofit/>
+          </a:bodyPr>
+          <a:lstStyle/>
+          <a:p>
+            <a:r>
+              <a:rPr lang="en-US" sz="1800" dirty="0"/>
+              <a:t>Action-based Expected Threat for successful defensive duels in isolated possession chains</a:t>
+            </a:r>
+            <a:br>
+              <a:rPr lang="en-US" sz="1800" dirty="0"/>
+            </a:br>
+            <a:endParaRPr lang="en-US" sz="1800" dirty="0"/>
+          </a:p>
+          <a:p>
+            <a:r>
+              <a:rPr lang="en-IN" sz="1800" dirty="0"/>
+              <a:t>Xgboost model trained for Bundesliga possession chains and scored on Serie A midfielders</a:t>
+            </a:r>
+          </a:p>
+          <a:p>
+            <a:r>
+              <a:rPr lang="en-IN" sz="1800" dirty="0"/>
+              <a:t>Filtered down to ‘Ground defending duel’ actions only as the model was skewed towards tall forwards</a:t>
+            </a:r>
+          </a:p>
+          <a:p>
+            <a:r>
+              <a:rPr lang="en-IN" sz="1800" dirty="0"/>
+              <a:t>Normalized to reflect per 90 stats scaled down for opposition possession %</a:t>
+            </a:r>
+          </a:p>
+          <a:p>
+            <a:pPr marL="0" indent="0">
+              <a:buNone/>
+            </a:pPr>
+            <a:endParaRPr lang="en-US" sz="1800" dirty="0"/>
+          </a:p>
+        </p:txBody>
+      </p:sp>
       <p:pic>
         <p:nvPicPr>
-          <p:cNvPr id="4" name="Picture 3">
-            <a:extLst>
-              <a:ext uri="{FF2B5EF4-FFF2-40B4-BE49-F238E27FC236}">
-                <a16:creationId xmlns:a16="http://schemas.microsoft.com/office/drawing/2014/main" id="{48E6CFB6-0004-7F46-BDC0-C9BCB3D3C019}"/>
-              </a:ext>
-            </a:extLst>
-          </p:cNvPr>
-          <p:cNvPicPr/>
+          <p:cNvPr id="8" name="Picture 7">
+            <a:extLst>
+              <a:ext uri="{FF2B5EF4-FFF2-40B4-BE49-F238E27FC236}">
+                <a16:creationId xmlns:a16="http://schemas.microsoft.com/office/drawing/2014/main" id="{58DEDFDA-21C0-1540-89AA-6E4C2027D6A9}"/>
+              </a:ext>
+            </a:extLst>
+          </p:cNvPr>
+          <p:cNvPicPr>
+            <a:picLocks noChangeAspect="1"/>
+          </p:cNvPicPr>
           <p:nvPr/>
         </p:nvPicPr>
         <p:blipFill>
@@ -3451,8 +3548,8 @@
         </p:blipFill>
         <p:spPr>
           <a:xfrm>
-            <a:off x="2667816" y="4027763"/>
-            <a:ext cx="6856362" cy="2149200"/>
+            <a:off x="1316790" y="1690688"/>
+            <a:ext cx="8788400" cy="1879600"/>
           </a:xfrm>
           <a:prstGeom prst="rect">
             <a:avLst/>
@@ -3461,96 +3558,10 @@
       </p:pic>
       <p:sp>
         <p:nvSpPr>
-          <p:cNvPr id="2" name="Title 1">
-            <a:extLst>
-              <a:ext uri="{FF2B5EF4-FFF2-40B4-BE49-F238E27FC236}">
-                <a16:creationId xmlns:a16="http://schemas.microsoft.com/office/drawing/2014/main" id="{1EA14AED-E892-0E44-8DB1-27409BE942B4}"/>
-              </a:ext>
-            </a:extLst>
-          </p:cNvPr>
-          <p:cNvSpPr>
-            <a:spLocks noGrp="1"/>
-          </p:cNvSpPr>
-          <p:nvPr>
-            <p:ph type="title"/>
-          </p:nvPr>
-        </p:nvSpPr>
-        <p:spPr/>
-        <p:txBody>
-          <a:bodyPr/>
-          <a:lstStyle/>
-          <a:p>
-            <a:r>
-              <a:rPr lang="en-US" b="1" dirty="0"/>
-              <a:t>Metric</a:t>
-            </a:r>
-          </a:p>
-        </p:txBody>
-      </p:sp>
-      <p:sp>
-        <p:nvSpPr>
-          <p:cNvPr id="3" name="Content Placeholder 2">
-            <a:extLst>
-              <a:ext uri="{FF2B5EF4-FFF2-40B4-BE49-F238E27FC236}">
-                <a16:creationId xmlns:a16="http://schemas.microsoft.com/office/drawing/2014/main" id="{C2F341F4-6ADF-D24F-86D9-55634BE3C1C0}"/>
-              </a:ext>
-            </a:extLst>
-          </p:cNvPr>
-          <p:cNvSpPr>
-            <a:spLocks noGrp="1"/>
-          </p:cNvSpPr>
-          <p:nvPr>
-            <p:ph idx="1"/>
-          </p:nvPr>
-        </p:nvSpPr>
-        <p:spPr/>
-        <p:txBody>
-          <a:bodyPr>
-            <a:normAutofit/>
-          </a:bodyPr>
-          <a:lstStyle/>
-          <a:p>
-            <a:r>
-              <a:rPr lang="en-US" sz="1800" dirty="0"/>
-              <a:t>Action-based Expected Threat for successful defensive duels in isolated possession chains</a:t>
-            </a:r>
-            <a:br>
-              <a:rPr lang="en-US" sz="1800" dirty="0"/>
-            </a:br>
-            <a:endParaRPr lang="en-US" sz="1800" dirty="0"/>
-          </a:p>
-          <a:p>
-            <a:r>
-              <a:rPr lang="en-IN" sz="1800" dirty="0"/>
-              <a:t>Xgboost model trained for Bundesliga possession chains and scored on Serie A midfielders</a:t>
-            </a:r>
-          </a:p>
-          <a:p>
-            <a:r>
-              <a:rPr lang="en-IN" sz="1800" dirty="0"/>
-              <a:t>Filtered down to ‘Ground defending duel’ actions only as the model was skewed towards tall forwards</a:t>
-            </a:r>
-          </a:p>
-          <a:p>
-            <a:r>
-              <a:rPr lang="en-IN" sz="1800" dirty="0"/>
-              <a:t>Normalized to reflect per 90 stats scaled down for opposition possession %</a:t>
-            </a:r>
-          </a:p>
-          <a:p>
-            <a:pPr marL="0" indent="0">
-              <a:buNone/>
-            </a:pPr>
-            <a:endParaRPr lang="en-US" sz="1800" dirty="0"/>
-          </a:p>
-        </p:txBody>
-      </p:sp>
-      <p:sp>
-        <p:nvSpPr>
-          <p:cNvPr id="5" name="Rectangle 4">
-            <a:extLst>
-              <a:ext uri="{FF2B5EF4-FFF2-40B4-BE49-F238E27FC236}">
-                <a16:creationId xmlns:a16="http://schemas.microsoft.com/office/drawing/2014/main" id="{45B0B8CF-EAF4-2C48-A3EE-DEF602CD7744}"/>
+          <p:cNvPr id="7" name="Rectangle 6">
+            <a:extLst>
+              <a:ext uri="{FF2B5EF4-FFF2-40B4-BE49-F238E27FC236}">
+                <a16:creationId xmlns:a16="http://schemas.microsoft.com/office/drawing/2014/main" id="{0D1DD5BC-34CE-7941-B569-7432F71B23BC}"/>
               </a:ext>
             </a:extLst>
           </p:cNvPr>
@@ -3559,8 +3570,8 @@
         </p:nvSpPr>
         <p:spPr>
           <a:xfrm>
-            <a:off x="2667820" y="5178392"/>
-            <a:ext cx="6856361" cy="192505"/>
+            <a:off x="8730115" y="1690688"/>
+            <a:ext cx="1375076" cy="1879600"/>
           </a:xfrm>
           <a:prstGeom prst="rect">
             <a:avLst/>
@@ -3586,16 +3597,16 @@
           <a:lstStyle/>
           <a:p>
             <a:pPr algn="ctr"/>
-            <a:endParaRPr lang="en-US"/>
-          </a:p>
-        </p:txBody>
-      </p:sp>
-      <p:sp>
-        <p:nvSpPr>
-          <p:cNvPr id="6" name="Rectangle 5">
-            <a:extLst>
-              <a:ext uri="{FF2B5EF4-FFF2-40B4-BE49-F238E27FC236}">
-                <a16:creationId xmlns:a16="http://schemas.microsoft.com/office/drawing/2014/main" id="{CDF45F23-F750-B64E-B683-15D9080909ED}"/>
+            <a:endParaRPr lang="en-US" b="1" dirty="0"/>
+          </a:p>
+        </p:txBody>
+      </p:sp>
+      <p:sp>
+        <p:nvSpPr>
+          <p:cNvPr id="5" name="Rectangle 4">
+            <a:extLst>
+              <a:ext uri="{FF2B5EF4-FFF2-40B4-BE49-F238E27FC236}">
+                <a16:creationId xmlns:a16="http://schemas.microsoft.com/office/drawing/2014/main" id="{45B0B8CF-EAF4-2C48-A3EE-DEF602CD7744}"/>
               </a:ext>
             </a:extLst>
           </p:cNvPr>
@@ -3604,8 +3615,8 @@
         </p:nvSpPr>
         <p:spPr>
           <a:xfrm>
-            <a:off x="2667818" y="5581424"/>
-            <a:ext cx="6856361" cy="192505"/>
+            <a:off x="1316788" y="2223436"/>
+            <a:ext cx="8788401" cy="155734"/>
           </a:xfrm>
           <a:prstGeom prst="rect">
             <a:avLst/>
@@ -3632,51 +3643,6 @@
           <a:p>
             <a:pPr algn="ctr"/>
             <a:endParaRPr lang="en-US"/>
-          </a:p>
-        </p:txBody>
-      </p:sp>
-      <p:sp>
-        <p:nvSpPr>
-          <p:cNvPr id="7" name="Rectangle 6">
-            <a:extLst>
-              <a:ext uri="{FF2B5EF4-FFF2-40B4-BE49-F238E27FC236}">
-                <a16:creationId xmlns:a16="http://schemas.microsoft.com/office/drawing/2014/main" id="{0D1DD5BC-34CE-7941-B569-7432F71B23BC}"/>
-              </a:ext>
-            </a:extLst>
-          </p:cNvPr>
-          <p:cNvSpPr/>
-          <p:nvPr/>
-        </p:nvSpPr>
-        <p:spPr>
-          <a:xfrm>
-            <a:off x="8604985" y="4039795"/>
-            <a:ext cx="919193" cy="2137168"/>
-          </a:xfrm>
-          <a:prstGeom prst="rect">
-            <a:avLst/>
-          </a:prstGeom>
-          <a:noFill/>
-        </p:spPr>
-        <p:style>
-          <a:lnRef idx="2">
-            <a:schemeClr val="accent6"/>
-          </a:lnRef>
-          <a:fillRef idx="1">
-            <a:schemeClr val="lt1"/>
-          </a:fillRef>
-          <a:effectRef idx="0">
-            <a:schemeClr val="accent6"/>
-          </a:effectRef>
-          <a:fontRef idx="minor">
-            <a:schemeClr val="dk1"/>
-          </a:fontRef>
-        </p:style>
-        <p:txBody>
-          <a:bodyPr rtlCol="0" anchor="ctr"/>
-          <a:lstStyle/>
-          <a:p>
-            <a:pPr algn="ctr"/>
-            <a:endParaRPr lang="en-US" b="1" dirty="0"/>
           </a:p>
         </p:txBody>
       </p:sp>
@@ -3924,10 +3890,417 @@
           </a:p>
         </p:txBody>
       </p:sp>
+      <p:pic>
+        <p:nvPicPr>
+          <p:cNvPr id="8" name="Content Placeholder 3">
+            <a:extLst>
+              <a:ext uri="{FF2B5EF4-FFF2-40B4-BE49-F238E27FC236}">
+                <a16:creationId xmlns:a16="http://schemas.microsoft.com/office/drawing/2014/main" id="{7DE342A2-7A39-A04B-AC4F-96C9A568953E}"/>
+              </a:ext>
+            </a:extLst>
+          </p:cNvPr>
+          <p:cNvPicPr>
+            <a:picLocks/>
+          </p:cNvPicPr>
+          <p:nvPr/>
+        </p:nvPicPr>
+        <p:blipFill>
+          <a:blip r:embed="rId5"/>
+          <a:stretch>
+            <a:fillRect/>
+          </a:stretch>
+        </p:blipFill>
+        <p:spPr>
+          <a:xfrm>
+            <a:off x="1703939" y="1411556"/>
+            <a:ext cx="3352800" cy="3632200"/>
+          </a:xfrm>
+          <a:prstGeom prst="rect">
+            <a:avLst/>
+          </a:prstGeom>
+        </p:spPr>
+      </p:pic>
     </p:spTree>
     <p:extLst>
       <p:ext uri="{BB962C8B-B14F-4D97-AF65-F5344CB8AC3E}">
         <p14:creationId xmlns:p14="http://schemas.microsoft.com/office/powerpoint/2010/main" val="3985726632"/>
+      </p:ext>
+    </p:extLst>
+  </p:cSld>
+  <p:clrMapOvr>
+    <a:masterClrMapping/>
+  </p:clrMapOvr>
+</p:sld>
+</file>
+
+<file path=ppt/slides/slide4.xml><?xml version="1.0" encoding="utf-8"?>
+<p:sld xmlns:a="http://schemas.openxmlformats.org/drawingml/2006/main" xmlns:r="http://schemas.openxmlformats.org/officeDocument/2006/relationships" xmlns:p="http://schemas.openxmlformats.org/presentationml/2006/main">
+  <p:cSld>
+    <p:spTree>
+      <p:nvGrpSpPr>
+        <p:cNvPr id="1" name=""/>
+        <p:cNvGrpSpPr/>
+        <p:nvPr/>
+      </p:nvGrpSpPr>
+      <p:grpSpPr>
+        <a:xfrm>
+          <a:off x="0" y="0"/>
+          <a:ext cx="0" cy="0"/>
+          <a:chOff x="0" y="0"/>
+          <a:chExt cx="0" cy="0"/>
+        </a:xfrm>
+      </p:grpSpPr>
+      <p:pic>
+        <p:nvPicPr>
+          <p:cNvPr id="4" name="Content Placeholder 3">
+            <a:extLst>
+              <a:ext uri="{FF2B5EF4-FFF2-40B4-BE49-F238E27FC236}">
+                <a16:creationId xmlns:a16="http://schemas.microsoft.com/office/drawing/2014/main" id="{4FE92B64-502C-7647-931A-257A737A18A1}"/>
+              </a:ext>
+            </a:extLst>
+          </p:cNvPr>
+          <p:cNvPicPr>
+            <a:picLocks noGrp="1" noChangeAspect="1"/>
+          </p:cNvPicPr>
+          <p:nvPr>
+            <p:ph idx="1"/>
+          </p:nvPr>
+        </p:nvPicPr>
+        <p:blipFill>
+          <a:blip r:embed="rId2"/>
+          <a:stretch>
+            <a:fillRect/>
+          </a:stretch>
+        </p:blipFill>
+        <p:spPr>
+          <a:xfrm>
+            <a:off x="7740620" y="2229644"/>
+            <a:ext cx="3122894" cy="3543300"/>
+          </a:xfrm>
+          <a:prstGeom prst="rect">
+            <a:avLst/>
+          </a:prstGeom>
+        </p:spPr>
+      </p:pic>
+      <p:pic>
+        <p:nvPicPr>
+          <p:cNvPr id="5" name="Picture 4">
+            <a:extLst>
+              <a:ext uri="{FF2B5EF4-FFF2-40B4-BE49-F238E27FC236}">
+                <a16:creationId xmlns:a16="http://schemas.microsoft.com/office/drawing/2014/main" id="{979AFC29-BCF2-A940-B975-CEC759629090}"/>
+              </a:ext>
+            </a:extLst>
+          </p:cNvPr>
+          <p:cNvPicPr>
+            <a:picLocks noChangeAspect="1"/>
+          </p:cNvPicPr>
+          <p:nvPr/>
+        </p:nvPicPr>
+        <p:blipFill>
+          <a:blip r:embed="rId3"/>
+          <a:stretch>
+            <a:fillRect/>
+          </a:stretch>
+        </p:blipFill>
+        <p:spPr>
+          <a:xfrm>
+            <a:off x="4202260" y="2229644"/>
+            <a:ext cx="3086100" cy="3543300"/>
+          </a:xfrm>
+          <a:prstGeom prst="rect">
+            <a:avLst/>
+          </a:prstGeom>
+        </p:spPr>
+      </p:pic>
+      <p:pic>
+        <p:nvPicPr>
+          <p:cNvPr id="8" name="Picture 7">
+            <a:extLst>
+              <a:ext uri="{FF2B5EF4-FFF2-40B4-BE49-F238E27FC236}">
+                <a16:creationId xmlns:a16="http://schemas.microsoft.com/office/drawing/2014/main" id="{A66EDF5F-2DF2-9A48-BE2E-49ACE9AD2536}"/>
+              </a:ext>
+            </a:extLst>
+          </p:cNvPr>
+          <p:cNvPicPr>
+            <a:picLocks noChangeAspect="1"/>
+          </p:cNvPicPr>
+          <p:nvPr/>
+        </p:nvPicPr>
+        <p:blipFill>
+          <a:blip r:embed="rId4"/>
+          <a:stretch>
+            <a:fillRect/>
+          </a:stretch>
+        </p:blipFill>
+        <p:spPr>
+          <a:xfrm>
+            <a:off x="558800" y="-67658"/>
+            <a:ext cx="5537200" cy="2222500"/>
+          </a:xfrm>
+          <a:prstGeom prst="rect">
+            <a:avLst/>
+          </a:prstGeom>
+        </p:spPr>
+      </p:pic>
+      <p:pic>
+        <p:nvPicPr>
+          <p:cNvPr id="9" name="Content Placeholder 3">
+            <a:extLst>
+              <a:ext uri="{FF2B5EF4-FFF2-40B4-BE49-F238E27FC236}">
+                <a16:creationId xmlns:a16="http://schemas.microsoft.com/office/drawing/2014/main" id="{23742B2C-F8D3-7F4D-8FE9-894751BA3994}"/>
+              </a:ext>
+            </a:extLst>
+          </p:cNvPr>
+          <p:cNvPicPr>
+            <a:picLocks/>
+          </p:cNvPicPr>
+          <p:nvPr/>
+        </p:nvPicPr>
+        <p:blipFill>
+          <a:blip r:embed="rId5"/>
+          <a:stretch>
+            <a:fillRect/>
+          </a:stretch>
+        </p:blipFill>
+        <p:spPr>
+          <a:xfrm>
+            <a:off x="1651000" y="2229644"/>
+            <a:ext cx="3352800" cy="3632200"/>
+          </a:xfrm>
+          <a:prstGeom prst="rect">
+            <a:avLst/>
+          </a:prstGeom>
+        </p:spPr>
+      </p:pic>
+    </p:spTree>
+    <p:extLst>
+      <p:ext uri="{BB962C8B-B14F-4D97-AF65-F5344CB8AC3E}">
+        <p14:creationId xmlns:p14="http://schemas.microsoft.com/office/powerpoint/2010/main" val="1702433552"/>
+      </p:ext>
+    </p:extLst>
+  </p:cSld>
+  <p:clrMapOvr>
+    <a:masterClrMapping/>
+  </p:clrMapOvr>
+</p:sld>
+</file>
+
+<file path=ppt/slides/slide5.xml><?xml version="1.0" encoding="utf-8"?>
+<p:sld xmlns:a="http://schemas.openxmlformats.org/drawingml/2006/main" xmlns:r="http://schemas.openxmlformats.org/officeDocument/2006/relationships" xmlns:p="http://schemas.openxmlformats.org/presentationml/2006/main">
+  <p:cSld>
+    <p:spTree>
+      <p:nvGrpSpPr>
+        <p:cNvPr id="1" name=""/>
+        <p:cNvGrpSpPr/>
+        <p:nvPr/>
+      </p:nvGrpSpPr>
+      <p:grpSpPr>
+        <a:xfrm>
+          <a:off x="0" y="0"/>
+          <a:ext cx="0" cy="0"/>
+          <a:chOff x="0" y="0"/>
+          <a:chExt cx="0" cy="0"/>
+        </a:xfrm>
+      </p:grpSpPr>
+      <p:pic>
+        <p:nvPicPr>
+          <p:cNvPr id="8" name="Content Placeholder 3">
+            <a:extLst>
+              <a:ext uri="{FF2B5EF4-FFF2-40B4-BE49-F238E27FC236}">
+                <a16:creationId xmlns:a16="http://schemas.microsoft.com/office/drawing/2014/main" id="{76D089BD-9B3B-9A41-9D5F-24138D466958}"/>
+              </a:ext>
+            </a:extLst>
+          </p:cNvPr>
+          <p:cNvPicPr>
+            <a:picLocks/>
+          </p:cNvPicPr>
+          <p:nvPr/>
+        </p:nvPicPr>
+        <p:blipFill>
+          <a:blip r:embed="rId2"/>
+          <a:stretch>
+            <a:fillRect/>
+          </a:stretch>
+        </p:blipFill>
+        <p:spPr>
+          <a:xfrm>
+            <a:off x="3725778" y="1919036"/>
+            <a:ext cx="2434590" cy="2774315"/>
+          </a:xfrm>
+          <a:prstGeom prst="rect">
+            <a:avLst/>
+          </a:prstGeom>
+        </p:spPr>
+      </p:pic>
+      <p:sp>
+        <p:nvSpPr>
+          <p:cNvPr id="2" name="Title 1">
+            <a:extLst>
+              <a:ext uri="{FF2B5EF4-FFF2-40B4-BE49-F238E27FC236}">
+                <a16:creationId xmlns:a16="http://schemas.microsoft.com/office/drawing/2014/main" id="{AE5CEBC2-9C71-3D43-8849-D0807E7A7541}"/>
+              </a:ext>
+            </a:extLst>
+          </p:cNvPr>
+          <p:cNvSpPr>
+            <a:spLocks noGrp="1"/>
+          </p:cNvSpPr>
+          <p:nvPr>
+            <p:ph type="title"/>
+          </p:nvPr>
+        </p:nvSpPr>
+        <p:spPr/>
+        <p:txBody>
+          <a:bodyPr/>
+          <a:lstStyle/>
+          <a:p>
+            <a:endParaRPr lang="en-US"/>
+          </a:p>
+        </p:txBody>
+      </p:sp>
+      <p:pic>
+        <p:nvPicPr>
+          <p:cNvPr id="5" name="Picture 4">
+            <a:extLst>
+              <a:ext uri="{FF2B5EF4-FFF2-40B4-BE49-F238E27FC236}">
+                <a16:creationId xmlns:a16="http://schemas.microsoft.com/office/drawing/2014/main" id="{3686302C-6D6D-E442-ACD5-990C7D800954}"/>
+              </a:ext>
+            </a:extLst>
+          </p:cNvPr>
+          <p:cNvPicPr/>
+          <p:nvPr/>
+        </p:nvPicPr>
+        <p:blipFill>
+          <a:blip r:embed="rId3"/>
+          <a:stretch>
+            <a:fillRect/>
+          </a:stretch>
+        </p:blipFill>
+        <p:spPr>
+          <a:xfrm>
+            <a:off x="8730916" y="1919036"/>
+            <a:ext cx="2434590" cy="2774315"/>
+          </a:xfrm>
+          <a:prstGeom prst="rect">
+            <a:avLst/>
+          </a:prstGeom>
+        </p:spPr>
+      </p:pic>
+      <p:pic>
+        <p:nvPicPr>
+          <p:cNvPr id="7" name="Picture 6">
+            <a:extLst>
+              <a:ext uri="{FF2B5EF4-FFF2-40B4-BE49-F238E27FC236}">
+                <a16:creationId xmlns:a16="http://schemas.microsoft.com/office/drawing/2014/main" id="{0FF090BA-870D-E54C-A497-ADDA70D3081E}"/>
+              </a:ext>
+            </a:extLst>
+          </p:cNvPr>
+          <p:cNvPicPr/>
+          <p:nvPr/>
+        </p:nvPicPr>
+        <p:blipFill>
+          <a:blip r:embed="rId4"/>
+          <a:stretch>
+            <a:fillRect/>
+          </a:stretch>
+        </p:blipFill>
+        <p:spPr>
+          <a:xfrm>
+            <a:off x="1223209" y="1919036"/>
+            <a:ext cx="2434590" cy="2774316"/>
+          </a:xfrm>
+          <a:prstGeom prst="rect">
+            <a:avLst/>
+          </a:prstGeom>
+        </p:spPr>
+      </p:pic>
+      <p:pic>
+        <p:nvPicPr>
+          <p:cNvPr id="6" name="Picture 5">
+            <a:extLst>
+              <a:ext uri="{FF2B5EF4-FFF2-40B4-BE49-F238E27FC236}">
+                <a16:creationId xmlns:a16="http://schemas.microsoft.com/office/drawing/2014/main" id="{5D01EDE7-2181-0F47-A0D8-D350B9DDAF47}"/>
+              </a:ext>
+            </a:extLst>
+          </p:cNvPr>
+          <p:cNvPicPr/>
+          <p:nvPr/>
+        </p:nvPicPr>
+        <p:blipFill>
+          <a:blip r:embed="rId5"/>
+          <a:stretch>
+            <a:fillRect/>
+          </a:stretch>
+        </p:blipFill>
+        <p:spPr>
+          <a:xfrm>
+            <a:off x="6228347" y="1919036"/>
+            <a:ext cx="2434590" cy="2774315"/>
+          </a:xfrm>
+          <a:prstGeom prst="rect">
+            <a:avLst/>
+          </a:prstGeom>
+        </p:spPr>
+      </p:pic>
+      <p:pic>
+        <p:nvPicPr>
+          <p:cNvPr id="11" name="Content Placeholder 3">
+            <a:extLst>
+              <a:ext uri="{FF2B5EF4-FFF2-40B4-BE49-F238E27FC236}">
+                <a16:creationId xmlns:a16="http://schemas.microsoft.com/office/drawing/2014/main" id="{4FE92B64-502C-7647-931A-257A737A18A1}"/>
+              </a:ext>
+            </a:extLst>
+          </p:cNvPr>
+          <p:cNvPicPr/>
+          <p:nvPr/>
+        </p:nvPicPr>
+        <p:blipFill>
+          <a:blip r:embed="rId6"/>
+          <a:stretch>
+            <a:fillRect/>
+          </a:stretch>
+        </p:blipFill>
+        <p:spPr>
+          <a:xfrm>
+            <a:off x="1254323" y="1919036"/>
+            <a:ext cx="2403475" cy="2774315"/>
+          </a:xfrm>
+          <a:prstGeom prst="rect">
+            <a:avLst/>
+          </a:prstGeom>
+        </p:spPr>
+      </p:pic>
+      <p:pic>
+        <p:nvPicPr>
+          <p:cNvPr id="12" name="Picture 11">
+            <a:extLst>
+              <a:ext uri="{FF2B5EF4-FFF2-40B4-BE49-F238E27FC236}">
+                <a16:creationId xmlns:a16="http://schemas.microsoft.com/office/drawing/2014/main" id="{979AFC29-BCF2-A940-B975-CEC759629090}"/>
+              </a:ext>
+            </a:extLst>
+          </p:cNvPr>
+          <p:cNvPicPr/>
+          <p:nvPr/>
+        </p:nvPicPr>
+        <p:blipFill>
+          <a:blip r:embed="rId7"/>
+          <a:stretch>
+            <a:fillRect/>
+          </a:stretch>
+        </p:blipFill>
+        <p:spPr>
+          <a:xfrm>
+            <a:off x="1223208" y="1919035"/>
+            <a:ext cx="2434590" cy="2774316"/>
+          </a:xfrm>
+          <a:prstGeom prst="rect">
+            <a:avLst/>
+          </a:prstGeom>
+        </p:spPr>
+      </p:pic>
+    </p:spTree>
+    <p:extLst>
+      <p:ext uri="{BB962C8B-B14F-4D97-AF65-F5344CB8AC3E}">
+        <p14:creationId xmlns:p14="http://schemas.microsoft.com/office/powerpoint/2010/main" val="2138952425"/>
       </p:ext>
     </p:extLst>
   </p:cSld>

</xml_diff>